<commit_message>
Adding Perc image, motivation section
</commit_message>
<xml_diff>
--- a/graphs/4Core_SPEC2017.pptx
+++ b/graphs/4Core_SPEC2017.pptx
@@ -161,7 +161,6 @@
               <a:rPr lang="en-US" sz="3200" dirty="0" smtClean="0"/>
               <a:t>Mixes</a:t>
             </a:r>
-            <a:endParaRPr lang="en-US" sz="3200" dirty="0" smtClean="0"/>
           </a:p>
           <a:p>
             <a:pPr marL="0" indent="0" algn="l">
@@ -637,7 +636,7 @@
               </c:numCache>
             </c:numRef>
           </c:val>
-          <c:smooth val="0"/>
+          <c:smooth val="1"/>
         </c:ser>
         <c:ser>
           <c:idx val="5"/>
@@ -971,7 +970,7 @@
               </c:numCache>
             </c:numRef>
           </c:val>
-          <c:smooth val="0"/>
+          <c:smooth val="1"/>
         </c:ser>
         <c:ser>
           <c:idx val="6"/>
@@ -1303,7 +1302,7 @@
               </c:numCache>
             </c:numRef>
           </c:val>
-          <c:smooth val="0"/>
+          <c:smooth val="1"/>
         </c:ser>
         <c:ser>
           <c:idx val="7"/>
@@ -1634,7 +1633,7 @@
               </c:numCache>
             </c:numRef>
           </c:val>
-          <c:smooth val="0"/>
+          <c:smooth val="1"/>
         </c:ser>
         <c:dLbls>
           <c:showLegendKey val="0"/>
@@ -1645,8 +1644,8 @@
           <c:showBubbleSize val="0"/>
         </c:dLbls>
         <c:smooth val="0"/>
-        <c:axId val="-646200672"/>
-        <c:axId val="-646197408"/>
+        <c:axId val="-214895584"/>
+        <c:axId val="-214886336"/>
         <c:extLst>
           <c:ext xmlns:c15="http://schemas.microsoft.com/office/drawing/2012/chart" uri="{02D57815-91ED-43cb-92C2-25804820EDAC}">
             <c15:filteredLineSeries>
@@ -3038,7 +3037,7 @@
         </c:extLst>
       </c:lineChart>
       <c:catAx>
-        <c:axId val="-646200672"/>
+        <c:axId val="-214895584"/>
         <c:scaling>
           <c:orientation val="minMax"/>
         </c:scaling>
@@ -3110,7 +3109,7 @@
         <c:majorTickMark val="out"/>
         <c:minorTickMark val="none"/>
         <c:tickLblPos val="nextTo"/>
-        <c:crossAx val="-646197408"/>
+        <c:crossAx val="-214886336"/>
         <c:crosses val="autoZero"/>
         <c:auto val="1"/>
         <c:lblAlgn val="ctr"/>
@@ -3118,7 +3117,7 @@
         <c:noMultiLvlLbl val="0"/>
       </c:catAx>
       <c:valAx>
-        <c:axId val="-646197408"/>
+        <c:axId val="-214886336"/>
         <c:scaling>
           <c:orientation val="minMax"/>
           <c:max val="2.2000000000000002"/>
@@ -3248,7 +3247,7 @@
             <a:endParaRPr lang="en-US"/>
           </a:p>
         </c:txPr>
-        <c:crossAx val="-646200672"/>
+        <c:crossAx val="-214895584"/>
         <c:crosses val="autoZero"/>
         <c:crossBetween val="between"/>
         <c:majorUnit val="0.2"/>
@@ -3373,7 +3372,6 @@
               <a:rPr lang="en-US" sz="3200" dirty="0" smtClean="0"/>
               <a:t>Mixes</a:t>
             </a:r>
-            <a:endParaRPr lang="en-US" sz="3200" dirty="0" smtClean="0"/>
           </a:p>
           <a:p>
             <a:pPr algn="l">
@@ -3871,7 +3869,7 @@
               </c:numCache>
             </c:numRef>
           </c:val>
-          <c:smooth val="0"/>
+          <c:smooth val="1"/>
         </c:ser>
         <c:ser>
           <c:idx val="5"/>
@@ -4211,7 +4209,7 @@
               </c:numCache>
             </c:numRef>
           </c:val>
-          <c:smooth val="0"/>
+          <c:smooth val="1"/>
         </c:ser>
         <c:ser>
           <c:idx val="6"/>
@@ -4549,7 +4547,7 @@
               </c:numCache>
             </c:numRef>
           </c:val>
-          <c:smooth val="0"/>
+          <c:smooth val="1"/>
         </c:ser>
         <c:ser>
           <c:idx val="7"/>
@@ -4886,7 +4884,7 @@
               </c:numCache>
             </c:numRef>
           </c:val>
-          <c:smooth val="0"/>
+          <c:smooth val="1"/>
         </c:ser>
         <c:dLbls>
           <c:showLegendKey val="0"/>
@@ -4897,11 +4895,11 @@
           <c:showBubbleSize val="0"/>
         </c:dLbls>
         <c:smooth val="0"/>
-        <c:axId val="-646196320"/>
-        <c:axId val="-754191728"/>
+        <c:axId val="-214899392"/>
+        <c:axId val="-214892864"/>
       </c:lineChart>
       <c:catAx>
-        <c:axId val="-646196320"/>
+        <c:axId val="-214899392"/>
         <c:scaling>
           <c:orientation val="minMax"/>
         </c:scaling>
@@ -4973,7 +4971,7 @@
         <c:majorTickMark val="none"/>
         <c:minorTickMark val="none"/>
         <c:tickLblPos val="nextTo"/>
-        <c:crossAx val="-754191728"/>
+        <c:crossAx val="-214892864"/>
         <c:crosses val="autoZero"/>
         <c:auto val="1"/>
         <c:lblAlgn val="ctr"/>
@@ -4981,7 +4979,7 @@
         <c:noMultiLvlLbl val="0"/>
       </c:catAx>
       <c:valAx>
-        <c:axId val="-754191728"/>
+        <c:axId val="-214892864"/>
         <c:scaling>
           <c:orientation val="minMax"/>
           <c:max val="1.9"/>
@@ -5111,7 +5109,7 @@
             <a:endParaRPr lang="en-US"/>
           </a:p>
         </c:txPr>
-        <c:crossAx val="-646196320"/>
+        <c:crossAx val="-214899392"/>
         <c:crosses val="autoZero"/>
         <c:crossBetween val="between"/>
       </c:valAx>
@@ -6388,7 +6386,7 @@
           <a:p>
             <a:fld id="{08B8C7C1-914D-4689-9146-3BA6F51E5739}" type="datetimeFigureOut">
               <a:rPr lang="en-IN" smtClean="0"/>
-              <a:t>04-12-2018</a:t>
+              <a:t>05-12-2018</a:t>
             </a:fld>
             <a:endParaRPr lang="en-IN"/>
           </a:p>
@@ -6876,7 +6874,7 @@
           <a:p>
             <a:fld id="{39916FE8-3123-4628-9975-23EC1927EBA1}" type="datetimeFigureOut">
               <a:rPr lang="en-IN" smtClean="0"/>
-              <a:t>04-12-2018</a:t>
+              <a:t>05-12-2018</a:t>
             </a:fld>
             <a:endParaRPr lang="en-IN"/>
           </a:p>
@@ -7046,7 +7044,7 @@
           <a:p>
             <a:fld id="{39916FE8-3123-4628-9975-23EC1927EBA1}" type="datetimeFigureOut">
               <a:rPr lang="en-IN" smtClean="0"/>
-              <a:t>04-12-2018</a:t>
+              <a:t>05-12-2018</a:t>
             </a:fld>
             <a:endParaRPr lang="en-IN"/>
           </a:p>
@@ -7226,7 +7224,7 @@
           <a:p>
             <a:fld id="{39916FE8-3123-4628-9975-23EC1927EBA1}" type="datetimeFigureOut">
               <a:rPr lang="en-IN" smtClean="0"/>
-              <a:t>04-12-2018</a:t>
+              <a:t>05-12-2018</a:t>
             </a:fld>
             <a:endParaRPr lang="en-IN"/>
           </a:p>
@@ -7396,7 +7394,7 @@
           <a:p>
             <a:fld id="{39916FE8-3123-4628-9975-23EC1927EBA1}" type="datetimeFigureOut">
               <a:rPr lang="en-IN" smtClean="0"/>
-              <a:t>04-12-2018</a:t>
+              <a:t>05-12-2018</a:t>
             </a:fld>
             <a:endParaRPr lang="en-IN"/>
           </a:p>
@@ -7642,7 +7640,7 @@
           <a:p>
             <a:fld id="{39916FE8-3123-4628-9975-23EC1927EBA1}" type="datetimeFigureOut">
               <a:rPr lang="en-IN" smtClean="0"/>
-              <a:t>04-12-2018</a:t>
+              <a:t>05-12-2018</a:t>
             </a:fld>
             <a:endParaRPr lang="en-IN"/>
           </a:p>
@@ -7874,7 +7872,7 @@
           <a:p>
             <a:fld id="{39916FE8-3123-4628-9975-23EC1927EBA1}" type="datetimeFigureOut">
               <a:rPr lang="en-IN" smtClean="0"/>
-              <a:t>04-12-2018</a:t>
+              <a:t>05-12-2018</a:t>
             </a:fld>
             <a:endParaRPr lang="en-IN"/>
           </a:p>
@@ -8241,7 +8239,7 @@
           <a:p>
             <a:fld id="{39916FE8-3123-4628-9975-23EC1927EBA1}" type="datetimeFigureOut">
               <a:rPr lang="en-IN" smtClean="0"/>
-              <a:t>04-12-2018</a:t>
+              <a:t>05-12-2018</a:t>
             </a:fld>
             <a:endParaRPr lang="en-IN"/>
           </a:p>
@@ -8359,7 +8357,7 @@
           <a:p>
             <a:fld id="{39916FE8-3123-4628-9975-23EC1927EBA1}" type="datetimeFigureOut">
               <a:rPr lang="en-IN" smtClean="0"/>
-              <a:t>04-12-2018</a:t>
+              <a:t>05-12-2018</a:t>
             </a:fld>
             <a:endParaRPr lang="en-IN"/>
           </a:p>
@@ -8454,7 +8452,7 @@
           <a:p>
             <a:fld id="{39916FE8-3123-4628-9975-23EC1927EBA1}" type="datetimeFigureOut">
               <a:rPr lang="en-IN" smtClean="0"/>
-              <a:t>04-12-2018</a:t>
+              <a:t>05-12-2018</a:t>
             </a:fld>
             <a:endParaRPr lang="en-IN"/>
           </a:p>
@@ -8731,7 +8729,7 @@
           <a:p>
             <a:fld id="{39916FE8-3123-4628-9975-23EC1927EBA1}" type="datetimeFigureOut">
               <a:rPr lang="en-IN" smtClean="0"/>
-              <a:t>04-12-2018</a:t>
+              <a:t>05-12-2018</a:t>
             </a:fld>
             <a:endParaRPr lang="en-IN"/>
           </a:p>
@@ -8988,7 +8986,7 @@
           <a:p>
             <a:fld id="{39916FE8-3123-4628-9975-23EC1927EBA1}" type="datetimeFigureOut">
               <a:rPr lang="en-IN" smtClean="0"/>
-              <a:t>04-12-2018</a:t>
+              <a:t>05-12-2018</a:t>
             </a:fld>
             <a:endParaRPr lang="en-IN"/>
           </a:p>
@@ -9201,7 +9199,7 @@
           <a:p>
             <a:fld id="{39916FE8-3123-4628-9975-23EC1927EBA1}" type="datetimeFigureOut">
               <a:rPr lang="en-IN" smtClean="0"/>
-              <a:t>04-12-2018</a:t>
+              <a:t>05-12-2018</a:t>
             </a:fld>
             <a:endParaRPr lang="en-IN"/>
           </a:p>

</xml_diff>